<commit_message>
MFY auto commit at 24/12/2021 21:55:43
</commit_message>
<xml_diff>
--- a/4) Operating Systems_AM/Lab/project/Muhammad Fahad.pptx
+++ b/4) Operating Systems_AM/Lab/project/Muhammad Fahad.pptx
@@ -236,7 +236,7 @@
           <a:p>
             <a:fld id="{71BD4573-58E7-4156-A133-2731F5F8D1A6}" type="datetimeFigureOut">
               <a:rPr lang="en-US" smtClean="0"/>
-              <a:t>12/23/2021</a:t>
+              <a:t>12/24/2021</a:t>
             </a:fld>
             <a:endParaRPr lang="en-US"/>
           </a:p>
@@ -903,7 +903,7 @@
           <a:p>
             <a:fld id="{021A1D30-C0A0-4124-A783-34D9F15FA0FE}" type="datetime1">
               <a:rPr lang="en-US" smtClean="0"/>
-              <a:t>12/23/2021</a:t>
+              <a:t>12/24/2021</a:t>
             </a:fld>
             <a:endParaRPr lang="en-US"/>
           </a:p>
@@ -1089,7 +1089,7 @@
           <a:p>
             <a:fld id="{8D2D5871-AB0F-4B3D-8861-97E78CB7B47E}" type="datetime1">
               <a:rPr lang="en-US" smtClean="0"/>
-              <a:t>12/23/2021</a:t>
+              <a:t>12/24/2021</a:t>
             </a:fld>
             <a:endParaRPr lang="en-US"/>
           </a:p>
@@ -1285,7 +1285,7 @@
           <a:p>
             <a:fld id="{14418406-4C3F-4F3E-80BD-A22568EA37EB}" type="datetime1">
               <a:rPr lang="en-US" smtClean="0"/>
-              <a:t>12/23/2021</a:t>
+              <a:t>12/24/2021</a:t>
             </a:fld>
             <a:endParaRPr lang="en-US"/>
           </a:p>
@@ -1471,7 +1471,7 @@
           <a:p>
             <a:fld id="{65F28077-7188-48C5-8679-2287FAC952E9}" type="datetime1">
               <a:rPr lang="en-US" smtClean="0"/>
-              <a:t>12/23/2021</a:t>
+              <a:t>12/24/2021</a:t>
             </a:fld>
             <a:endParaRPr lang="en-US"/>
           </a:p>
@@ -1720,7 +1720,7 @@
           <a:p>
             <a:fld id="{D2DCB740-6776-4EE9-99FD-96D592FA5A23}" type="datetime1">
               <a:rPr lang="en-US" smtClean="0"/>
-              <a:t>12/23/2021</a:t>
+              <a:t>12/24/2021</a:t>
             </a:fld>
             <a:endParaRPr lang="en-US"/>
           </a:p>
@@ -2005,7 +2005,7 @@
           <a:p>
             <a:fld id="{05F6BD99-6FFD-46C5-B5E2-43A34BDA2566}" type="datetime1">
               <a:rPr lang="en-US" smtClean="0"/>
-              <a:t>12/23/2021</a:t>
+              <a:t>12/24/2021</a:t>
             </a:fld>
             <a:endParaRPr lang="en-US"/>
           </a:p>
@@ -2404,7 +2404,7 @@
           <a:p>
             <a:fld id="{E022678E-214C-4CF8-97C7-95015FB02960}" type="datetime1">
               <a:rPr lang="en-US" smtClean="0"/>
-              <a:t>12/23/2021</a:t>
+              <a:t>12/24/2021</a:t>
             </a:fld>
             <a:endParaRPr lang="en-US"/>
           </a:p>
@@ -2575,7 +2575,7 @@
           <a:p>
             <a:fld id="{D55660E0-FA77-4473-A859-74127B089143}" type="datetime1">
               <a:rPr lang="en-US" smtClean="0"/>
-              <a:t>12/23/2021</a:t>
+              <a:t>12/24/2021</a:t>
             </a:fld>
             <a:endParaRPr lang="en-US"/>
           </a:p>
@@ -2686,7 +2686,7 @@
           <a:p>
             <a:fld id="{3188D7B8-9F07-4899-827D-5F3CFDDEB574}" type="datetime1">
               <a:rPr lang="en-US" smtClean="0"/>
-              <a:t>12/23/2021</a:t>
+              <a:t>12/24/2021</a:t>
             </a:fld>
             <a:endParaRPr lang="en-US"/>
           </a:p>
@@ -2968,7 +2968,7 @@
           <a:p>
             <a:fld id="{B5197C5C-1CD1-417D-A89C-14747F5222C7}" type="datetime1">
               <a:rPr lang="en-US" smtClean="0"/>
-              <a:t>12/23/2021</a:t>
+              <a:t>12/24/2021</a:t>
             </a:fld>
             <a:endParaRPr lang="en-US"/>
           </a:p>
@@ -3323,7 +3323,7 @@
           <a:p>
             <a:fld id="{1359EFBB-CFA1-4AA8-9123-F0B52DBD84FE}" type="datetime1">
               <a:rPr lang="en-US" smtClean="0"/>
-              <a:t>12/23/2021</a:t>
+              <a:t>12/24/2021</a:t>
             </a:fld>
             <a:endParaRPr lang="en-US"/>
           </a:p>
@@ -4358,7 +4358,7 @@
             <a:fld id="{61146459-E3C3-4969-9224-5ED50B492D17}" type="datetime1">
               <a:rPr lang="en-US" smtClean="0"/>
               <a:pPr/>
-              <a:t>12/23/2021</a:t>
+              <a:t>12/24/2021</a:t>
             </a:fld>
             <a:endParaRPr lang="en-US" dirty="0"/>
           </a:p>
@@ -7250,11 +7250,7 @@
           <a:p>
             <a:r>
               <a:rPr lang="en-US" b="1" dirty="0"/>
-              <a:t>SHORTEST Job </a:t>
-            </a:r>
-            <a:r>
-              <a:rPr lang="en-US" b="1" dirty="0"/>
-              <a:t>F</a:t>
+              <a:t>SHORTEST Job F</a:t>
             </a:r>
             <a:r>
               <a:rPr lang="en-US" b="1" dirty="0" smtClean="0"/>

</xml_diff>